<commit_message>
updated graphical model description
</commit_message>
<xml_diff>
--- a/images/LocationModelLinearDependentW.pptx
+++ b/images/LocationModelLinearDependentW.pptx
@@ -28243,8 +28243,8 @@
           </a:p>
         </p:txBody>
       </p:sp>
-      <mc:AlternateContent xmlns:mc="http://schemas.openxmlformats.org/markup-compatibility/2006" xmlns:a14="http://schemas.microsoft.com/office/drawing/2010/main">
-        <mc:Choice Requires="a14">
+      <mc:AlternateContent xmlns:mc="http://schemas.openxmlformats.org/markup-compatibility/2006">
+        <mc:Choice xmlns:a14="http://schemas.microsoft.com/office/drawing/2010/main" Requires="a14">
           <p:sp>
             <p:nvSpPr>
               <p:cNvPr id="11" name="TextBox 10">
@@ -28261,7 +28261,7 @@
             </p:nvSpPr>
             <p:spPr>
               <a:xfrm>
-                <a:off x="8499734" y="6386276"/>
+                <a:off x="8509530" y="6424107"/>
                 <a:ext cx="481593" cy="299569"/>
               </a:xfrm>
               <a:prstGeom prst="rect">
@@ -28331,7 +28331,7 @@
             </p:txBody>
           </p:sp>
         </mc:Choice>
-        <mc:Fallback xmlns="">
+        <mc:Fallback>
           <p:sp>
             <p:nvSpPr>
               <p:cNvPr id="11" name="TextBox 10">
@@ -28348,7 +28348,7 @@
             </p:nvSpPr>
             <p:spPr>
               <a:xfrm>
-                <a:off x="8499734" y="6386276"/>
+                <a:off x="8509530" y="6424107"/>
                 <a:ext cx="481593" cy="299569"/>
               </a:xfrm>
               <a:prstGeom prst="rect">
@@ -30065,131 +30065,6 @@
       </mc:AlternateContent>
       <p:sp>
         <p:nvSpPr>
-          <p:cNvPr id="66" name="Oval 65">
-            <a:extLst>
-              <a:ext uri="{FF2B5EF4-FFF2-40B4-BE49-F238E27FC236}">
-                <a16:creationId xmlns:a16="http://schemas.microsoft.com/office/drawing/2014/main" id="{FF162F58-C944-F04B-8AD7-364997FF6F71}"/>
-              </a:ext>
-            </a:extLst>
-          </p:cNvPr>
-          <p:cNvSpPr>
-            <a:spLocks noChangeAspect="1"/>
-          </p:cNvSpPr>
-          <p:nvPr/>
-        </p:nvSpPr>
-        <p:spPr>
-          <a:xfrm>
-            <a:off x="8493804" y="6351311"/>
-            <a:ext cx="460319" cy="460319"/>
-          </a:xfrm>
-          <a:prstGeom prst="ellipse">
-            <a:avLst/>
-          </a:prstGeom>
-          <a:noFill/>
-          <a:ln w="12700">
-            <a:solidFill>
-              <a:schemeClr val="tx1"/>
-            </a:solidFill>
-            <a:extLst>
-              <a:ext uri="{C807C97D-BFC1-408E-A445-0C87EB9F89A2}">
-                <ask:lineSketchStyleProps xmlns="" xmlns:ask="http://schemas.microsoft.com/office/drawing/2018/sketchyshapes" sd="1219033472">
-                  <a:custGeom>
-                    <a:avLst/>
-                    <a:gdLst>
-                      <a:gd name="connsiteX0" fmla="*/ 0 w 636975"/>
-                      <a:gd name="connsiteY0" fmla="*/ 318488 h 636975"/>
-                      <a:gd name="connsiteX1" fmla="*/ 318488 w 636975"/>
-                      <a:gd name="connsiteY1" fmla="*/ 0 h 636975"/>
-                      <a:gd name="connsiteX2" fmla="*/ 636976 w 636975"/>
-                      <a:gd name="connsiteY2" fmla="*/ 318488 h 636975"/>
-                      <a:gd name="connsiteX3" fmla="*/ 318488 w 636975"/>
-                      <a:gd name="connsiteY3" fmla="*/ 636976 h 636975"/>
-                      <a:gd name="connsiteX4" fmla="*/ 0 w 636975"/>
-                      <a:gd name="connsiteY4" fmla="*/ 318488 h 636975"/>
-                    </a:gdLst>
-                    <a:ahLst/>
-                    <a:cxnLst>
-                      <a:cxn ang="0">
-                        <a:pos x="connsiteX0" y="connsiteY0"/>
-                      </a:cxn>
-                      <a:cxn ang="0">
-                        <a:pos x="connsiteX1" y="connsiteY1"/>
-                      </a:cxn>
-                      <a:cxn ang="0">
-                        <a:pos x="connsiteX2" y="connsiteY2"/>
-                      </a:cxn>
-                      <a:cxn ang="0">
-                        <a:pos x="connsiteX3" y="connsiteY3"/>
-                      </a:cxn>
-                      <a:cxn ang="0">
-                        <a:pos x="connsiteX4" y="connsiteY4"/>
-                      </a:cxn>
-                    </a:cxnLst>
-                    <a:rect l="l" t="t" r="r" b="b"/>
-                    <a:pathLst>
-                      <a:path w="636975" h="636975" extrusionOk="0">
-                        <a:moveTo>
-                          <a:pt x="0" y="318488"/>
-                        </a:moveTo>
-                        <a:cubicBezTo>
-                          <a:pt x="-44217" y="115318"/>
-                          <a:pt x="124534" y="6778"/>
-                          <a:pt x="318488" y="0"/>
-                        </a:cubicBezTo>
-                        <a:cubicBezTo>
-                          <a:pt x="536421" y="8850"/>
-                          <a:pt x="599021" y="143799"/>
-                          <a:pt x="636976" y="318488"/>
-                        </a:cubicBezTo>
-                        <a:cubicBezTo>
-                          <a:pt x="607394" y="523273"/>
-                          <a:pt x="487332" y="675955"/>
-                          <a:pt x="318488" y="636976"/>
-                        </a:cubicBezTo>
-                        <a:cubicBezTo>
-                          <a:pt x="125128" y="627421"/>
-                          <a:pt x="15360" y="501723"/>
-                          <a:pt x="0" y="318488"/>
-                        </a:cubicBezTo>
-                        <a:close/>
-                      </a:path>
-                    </a:pathLst>
-                  </a:custGeom>
-                  <ask:type>
-                    <ask:lineSketchNone/>
-                  </ask:type>
-                </ask:lineSketchStyleProps>
-              </a:ext>
-            </a:extLst>
-          </a:ln>
-        </p:spPr>
-        <p:style>
-          <a:lnRef idx="2">
-            <a:schemeClr val="accent1">
-              <a:shade val="50000"/>
-            </a:schemeClr>
-          </a:lnRef>
-          <a:fillRef idx="1">
-            <a:schemeClr val="accent1"/>
-          </a:fillRef>
-          <a:effectRef idx="0">
-            <a:schemeClr val="accent1"/>
-          </a:effectRef>
-          <a:fontRef idx="minor">
-            <a:schemeClr val="lt1"/>
-          </a:fontRef>
-        </p:style>
-        <p:txBody>
-          <a:bodyPr rtlCol="0" anchor="ctr"/>
-          <a:lstStyle/>
-          <a:p>
-            <a:pPr algn="ctr"/>
-            <a:endParaRPr lang="en-US" sz="2200"/>
-          </a:p>
-        </p:txBody>
-      </p:sp>
-      <p:sp>
-        <p:nvSpPr>
           <p:cNvPr id="2" name="TextBox 1">
             <a:extLst>
               <a:ext uri="{FF2B5EF4-FFF2-40B4-BE49-F238E27FC236}">
@@ -31093,8 +30968,8 @@
         </p:nvSpPr>
         <p:spPr>
           <a:xfrm>
-            <a:off x="3437731" y="5728418"/>
-            <a:ext cx="1420988" cy="769441"/>
+            <a:off x="3146622" y="5676106"/>
+            <a:ext cx="1712097" cy="1107996"/>
           </a:xfrm>
           <a:prstGeom prst="rect">
             <a:avLst/>
@@ -31109,7 +30984,7 @@
           <a:p>
             <a:r>
               <a:rPr lang="en-US" sz="2200" dirty="0"/>
-              <a:t>Change in level</a:t>
+              <a:t>Change in technology sensitivity </a:t>
             </a:r>
           </a:p>
         </p:txBody>
@@ -33325,7 +33200,7 @@
         <p:spPr>
           <a:xfrm flipH="1">
             <a:off x="10379634" y="5992544"/>
-            <a:ext cx="591403" cy="183199"/>
+            <a:ext cx="590864" cy="183199"/>
           </a:xfrm>
           <a:prstGeom prst="straightConnector1">
             <a:avLst/>
@@ -33397,8 +33272,8 @@
           </a:fontRef>
         </p:style>
       </p:cxnSp>
-      <mc:AlternateContent xmlns:mc="http://schemas.openxmlformats.org/markup-compatibility/2006" xmlns:a14="http://schemas.microsoft.com/office/drawing/2010/main">
-        <mc:Choice Requires="a14">
+      <mc:AlternateContent xmlns:mc="http://schemas.openxmlformats.org/markup-compatibility/2006">
+        <mc:Choice xmlns:a14="http://schemas.microsoft.com/office/drawing/2010/main" Requires="a14">
           <p:sp>
             <p:nvSpPr>
               <p:cNvPr id="215" name="TextBox 214">
@@ -33415,7 +33290,7 @@
             </p:nvSpPr>
             <p:spPr>
               <a:xfrm>
-                <a:off x="10971037" y="5857218"/>
+                <a:off x="10970498" y="5857218"/>
                 <a:ext cx="275668" cy="270652"/>
               </a:xfrm>
               <a:prstGeom prst="rect">
@@ -33473,7 +33348,7 @@
             </p:txBody>
           </p:sp>
         </mc:Choice>
-        <mc:Fallback xmlns="">
+        <mc:Fallback>
           <p:sp>
             <p:nvSpPr>
               <p:cNvPr id="215" name="TextBox 214">
@@ -33490,7 +33365,7 @@
             </p:nvSpPr>
             <p:spPr>
               <a:xfrm>
-                <a:off x="10971037" y="5857218"/>
+                <a:off x="10970498" y="5857218"/>
                 <a:ext cx="275668" cy="270652"/>
               </a:xfrm>
               <a:prstGeom prst="rect">
@@ -33628,7 +33503,7 @@
         <p:spPr>
           <a:xfrm flipH="1">
             <a:off x="10553995" y="6630516"/>
-            <a:ext cx="417042" cy="16968"/>
+            <a:ext cx="416503" cy="16968"/>
           </a:xfrm>
           <a:prstGeom prst="straightConnector1">
             <a:avLst/>
@@ -33711,7 +33586,7 @@
         <p:spPr>
           <a:xfrm flipH="1">
             <a:off x="9876028" y="7359883"/>
-            <a:ext cx="1066124" cy="381050"/>
+            <a:ext cx="1065585" cy="381050"/>
           </a:xfrm>
           <a:prstGeom prst="straightConnector1">
             <a:avLst/>
@@ -33738,8 +33613,8 @@
           </a:fontRef>
         </p:style>
       </p:cxnSp>
-      <mc:AlternateContent xmlns:mc="http://schemas.openxmlformats.org/markup-compatibility/2006" xmlns:a14="http://schemas.microsoft.com/office/drawing/2010/main">
-        <mc:Choice Requires="a14">
+      <mc:AlternateContent xmlns:mc="http://schemas.openxmlformats.org/markup-compatibility/2006">
+        <mc:Choice xmlns:a14="http://schemas.microsoft.com/office/drawing/2010/main" Requires="a14">
           <p:sp>
             <p:nvSpPr>
               <p:cNvPr id="248" name="TextBox 247">
@@ -33756,7 +33631,7 @@
             </p:nvSpPr>
             <p:spPr>
               <a:xfrm>
-                <a:off x="10942152" y="7221383"/>
+                <a:off x="10941613" y="7221383"/>
                 <a:ext cx="333439" cy="276999"/>
               </a:xfrm>
               <a:prstGeom prst="rect">
@@ -33823,7 +33698,7 @@
             </p:txBody>
           </p:sp>
         </mc:Choice>
-        <mc:Fallback xmlns="">
+        <mc:Fallback>
           <p:sp>
             <p:nvSpPr>
               <p:cNvPr id="248" name="TextBox 247">
@@ -33840,7 +33715,7 @@
             </p:nvSpPr>
             <p:spPr>
               <a:xfrm>
-                <a:off x="10942152" y="7221383"/>
+                <a:off x="10941613" y="7221383"/>
                 <a:ext cx="333439" cy="276999"/>
               </a:xfrm>
               <a:prstGeom prst="rect">
@@ -33985,8 +33860,8 @@
           </p:sp>
         </mc:Fallback>
       </mc:AlternateContent>
-      <mc:AlternateContent xmlns:mc="http://schemas.openxmlformats.org/markup-compatibility/2006" xmlns:a14="http://schemas.microsoft.com/office/drawing/2010/main">
-        <mc:Choice Requires="a14">
+      <mc:AlternateContent xmlns:mc="http://schemas.openxmlformats.org/markup-compatibility/2006">
+        <mc:Choice xmlns:a14="http://schemas.microsoft.com/office/drawing/2010/main" Requires="a14">
           <p:sp>
             <p:nvSpPr>
               <p:cNvPr id="262" name="TextBox 261">
@@ -34003,15 +33878,15 @@
             </p:nvSpPr>
             <p:spPr>
               <a:xfrm>
-                <a:off x="10971037" y="6488297"/>
+                <a:off x="10970498" y="6488297"/>
                 <a:ext cx="275668" cy="284437"/>
               </a:xfrm>
               <a:prstGeom prst="rect">
                 <a:avLst/>
               </a:prstGeom>
               <a:solidFill>
-                <a:schemeClr val="bg1">
-                  <a:lumMod val="75000"/>
+                <a:schemeClr val="bg2">
+                  <a:lumMod val="10000"/>
                 </a:schemeClr>
               </a:solidFill>
             </p:spPr>
@@ -34033,6 +33908,9 @@
                           <m:chr m:val="̂"/>
                           <m:ctrlPr>
                             <a:rPr lang="en-US" sz="1800" i="1" smtClean="0">
+                              <a:solidFill>
+                                <a:schemeClr val="bg1"/>
+                              </a:solidFill>
                               <a:latin typeface="Cambria Math" panose="02040503050406030204" pitchFamily="18" charset="0"/>
                             </a:rPr>
                           </m:ctrlPr>
@@ -34040,6 +33918,9 @@
                         <m:e>
                           <m:r>
                             <a:rPr lang="en-US" sz="1800" b="0" i="1" smtClean="0">
+                              <a:solidFill>
+                                <a:schemeClr val="bg1"/>
+                              </a:solidFill>
                               <a:latin typeface="Cambria Math" panose="02040503050406030204" pitchFamily="18" charset="0"/>
                             </a:rPr>
                             <m:t>𝑌</m:t>
@@ -34049,12 +33930,16 @@
                     </m:oMath>
                   </m:oMathPara>
                 </a14:m>
-                <a:endParaRPr lang="en-US" sz="1800" i="1" dirty="0"/>
+                <a:endParaRPr lang="en-US" sz="1800" i="1" dirty="0">
+                  <a:solidFill>
+                    <a:schemeClr val="bg1"/>
+                  </a:solidFill>
+                </a:endParaRPr>
               </a:p>
             </p:txBody>
           </p:sp>
         </mc:Choice>
-        <mc:Fallback xmlns="">
+        <mc:Fallback>
           <p:sp>
             <p:nvSpPr>
               <p:cNvPr id="262" name="TextBox 261">
@@ -34071,7 +33956,7 @@
             </p:nvSpPr>
             <p:spPr>
               <a:xfrm>
-                <a:off x="10971037" y="6488297"/>
+                <a:off x="10970498" y="6488297"/>
                 <a:ext cx="275668" cy="284437"/>
               </a:xfrm>
               <a:prstGeom prst="rect">
@@ -34099,8 +33984,8 @@
           </p:sp>
         </mc:Fallback>
       </mc:AlternateContent>
-      <mc:AlternateContent xmlns:mc="http://schemas.openxmlformats.org/markup-compatibility/2006" xmlns:a14="http://schemas.microsoft.com/office/drawing/2010/main">
-        <mc:Choice Requires="a14">
+      <mc:AlternateContent xmlns:mc="http://schemas.openxmlformats.org/markup-compatibility/2006">
+        <mc:Choice xmlns:a14="http://schemas.microsoft.com/office/drawing/2010/main" Requires="a14">
           <p:sp>
             <p:nvSpPr>
               <p:cNvPr id="270" name="TextBox 269">
@@ -34117,7 +34002,7 @@
             </p:nvSpPr>
             <p:spPr>
               <a:xfrm>
-                <a:off x="10971037" y="7780412"/>
+                <a:off x="10970498" y="7780412"/>
                 <a:ext cx="275668" cy="276999"/>
               </a:xfrm>
               <a:prstGeom prst="rect">
@@ -34156,7 +34041,7 @@
             </p:txBody>
           </p:sp>
         </mc:Choice>
-        <mc:Fallback xmlns="">
+        <mc:Fallback>
           <p:sp>
             <p:nvSpPr>
               <p:cNvPr id="270" name="TextBox 269">
@@ -34173,7 +34058,7 @@
             </p:nvSpPr>
             <p:spPr>
               <a:xfrm>
-                <a:off x="10971037" y="7780412"/>
+                <a:off x="10970498" y="7780412"/>
                 <a:ext cx="275668" cy="276999"/>
               </a:xfrm>
               <a:prstGeom prst="rect">
@@ -34220,7 +34105,7 @@
         <p:spPr>
           <a:xfrm flipH="1">
             <a:off x="10604261" y="7918912"/>
-            <a:ext cx="366776" cy="381714"/>
+            <a:ext cx="366237" cy="381714"/>
           </a:xfrm>
           <a:prstGeom prst="straightConnector1">
             <a:avLst/>
@@ -34554,10 +34439,10 @@
         </p:nvGrpSpPr>
         <p:grpSpPr>
           <a:xfrm>
-            <a:off x="3928368" y="11129414"/>
-            <a:ext cx="10051509" cy="769441"/>
+            <a:off x="3928368" y="11153853"/>
+            <a:ext cx="10482163" cy="770383"/>
             <a:chOff x="5683032" y="11109516"/>
-            <a:chExt cx="10051509" cy="769441"/>
+            <a:chExt cx="10482163" cy="770383"/>
           </a:xfrm>
         </p:grpSpPr>
         <p:grpSp>
@@ -34679,10 +34564,10 @@
         </p:grpSp>
         <p:grpSp>
           <p:nvGrpSpPr>
-            <p:cNvPr id="13" name="Group 12">
+            <p:cNvPr id="9" name="Group 8">
               <a:extLst>
                 <a:ext uri="{FF2B5EF4-FFF2-40B4-BE49-F238E27FC236}">
-                  <a16:creationId xmlns:a16="http://schemas.microsoft.com/office/drawing/2014/main" id="{45ECB3B8-B655-4C46-8AC1-EBAB90DF9E99}"/>
+                  <a16:creationId xmlns:a16="http://schemas.microsoft.com/office/drawing/2014/main" id="{105322B4-670C-054E-98CF-5B7BFCE784C7}"/>
                 </a:ext>
               </a:extLst>
             </p:cNvPr>
@@ -34691,18 +34576,18 @@
           </p:nvGrpSpPr>
           <p:grpSpPr>
             <a:xfrm>
-              <a:off x="10595124" y="11261754"/>
-              <a:ext cx="2311220" cy="464964"/>
-              <a:chOff x="10595124" y="11307142"/>
-              <a:chExt cx="2311220" cy="464964"/>
+              <a:off x="7706995" y="11110458"/>
+              <a:ext cx="2381828" cy="769441"/>
+              <a:chOff x="7706995" y="11113272"/>
+              <a:chExt cx="2381828" cy="769441"/>
             </a:xfrm>
           </p:grpSpPr>
           <p:sp>
             <p:nvSpPr>
-              <p:cNvPr id="93" name="TextBox 92">
+              <p:cNvPr id="91" name="TextBox 90">
                 <a:extLst>
                   <a:ext uri="{FF2B5EF4-FFF2-40B4-BE49-F238E27FC236}">
-                    <a16:creationId xmlns:a16="http://schemas.microsoft.com/office/drawing/2014/main" id="{FEDC50F1-ABDC-AF4F-B0E1-309BC23517D4}"/>
+                    <a16:creationId xmlns:a16="http://schemas.microsoft.com/office/drawing/2014/main" id="{AB720DAB-BBBA-1145-8AB7-FB67B76CAF88}"/>
                   </a:ext>
                 </a:extLst>
               </p:cNvPr>
@@ -34713,8 +34598,8 @@
             </p:nvSpPr>
             <p:spPr>
               <a:xfrm>
-                <a:off x="11093153" y="11324181"/>
-                <a:ext cx="1813191" cy="430887"/>
+                <a:off x="8275632" y="11113272"/>
+                <a:ext cx="1813191" cy="769441"/>
               </a:xfrm>
               <a:prstGeom prst="rect">
                 <a:avLst/>
@@ -34729,17 +34614,17 @@
               <a:p>
                 <a:r>
                   <a:rPr lang="en-US" sz="2200" dirty="0"/>
-                  <a:t>Parameter</a:t>
+                  <a:t>Unobserved variable</a:t>
                 </a:r>
               </a:p>
             </p:txBody>
           </p:sp>
           <p:sp>
             <p:nvSpPr>
-              <p:cNvPr id="99" name="Oval 98">
+              <p:cNvPr id="155" name="Oval 154">
                 <a:extLst>
                   <a:ext uri="{FF2B5EF4-FFF2-40B4-BE49-F238E27FC236}">
-                    <a16:creationId xmlns:a16="http://schemas.microsoft.com/office/drawing/2014/main" id="{54970646-84A3-8A46-AF8F-9D098B78FE3E}"/>
+                    <a16:creationId xmlns:a16="http://schemas.microsoft.com/office/drawing/2014/main" id="{9BF83545-0987-DA4D-B079-17A8F9678B3A}"/>
                   </a:ext>
                 </a:extLst>
               </p:cNvPr>
@@ -34750,8 +34635,8 @@
             </p:nvSpPr>
             <p:spPr>
               <a:xfrm>
-                <a:off x="10595124" y="11307142"/>
-                <a:ext cx="464964" cy="464964"/>
+                <a:off x="7706995" y="11227737"/>
+                <a:ext cx="538627" cy="538627"/>
               </a:xfrm>
               <a:prstGeom prst="ellipse">
                 <a:avLst/>
@@ -34761,6 +34646,77 @@
                 <a:solidFill>
                   <a:schemeClr val="tx1"/>
                 </a:solidFill>
+                <a:extLst>
+                  <a:ext uri="{C807C97D-BFC1-408E-A445-0C87EB9F89A2}">
+                    <ask:lineSketchStyleProps xmlns="" xmlns:ask="http://schemas.microsoft.com/office/drawing/2018/sketchyshapes" sd="1219033472">
+                      <a:custGeom>
+                        <a:avLst/>
+                        <a:gdLst>
+                          <a:gd name="connsiteX0" fmla="*/ 0 w 636975"/>
+                          <a:gd name="connsiteY0" fmla="*/ 318488 h 636975"/>
+                          <a:gd name="connsiteX1" fmla="*/ 318488 w 636975"/>
+                          <a:gd name="connsiteY1" fmla="*/ 0 h 636975"/>
+                          <a:gd name="connsiteX2" fmla="*/ 636976 w 636975"/>
+                          <a:gd name="connsiteY2" fmla="*/ 318488 h 636975"/>
+                          <a:gd name="connsiteX3" fmla="*/ 318488 w 636975"/>
+                          <a:gd name="connsiteY3" fmla="*/ 636976 h 636975"/>
+                          <a:gd name="connsiteX4" fmla="*/ 0 w 636975"/>
+                          <a:gd name="connsiteY4" fmla="*/ 318488 h 636975"/>
+                        </a:gdLst>
+                        <a:ahLst/>
+                        <a:cxnLst>
+                          <a:cxn ang="0">
+                            <a:pos x="connsiteX0" y="connsiteY0"/>
+                          </a:cxn>
+                          <a:cxn ang="0">
+                            <a:pos x="connsiteX1" y="connsiteY1"/>
+                          </a:cxn>
+                          <a:cxn ang="0">
+                            <a:pos x="connsiteX2" y="connsiteY2"/>
+                          </a:cxn>
+                          <a:cxn ang="0">
+                            <a:pos x="connsiteX3" y="connsiteY3"/>
+                          </a:cxn>
+                          <a:cxn ang="0">
+                            <a:pos x="connsiteX4" y="connsiteY4"/>
+                          </a:cxn>
+                        </a:cxnLst>
+                        <a:rect l="l" t="t" r="r" b="b"/>
+                        <a:pathLst>
+                          <a:path w="636975" h="636975" extrusionOk="0">
+                            <a:moveTo>
+                              <a:pt x="0" y="318488"/>
+                            </a:moveTo>
+                            <a:cubicBezTo>
+                              <a:pt x="-44217" y="115318"/>
+                              <a:pt x="124534" y="6778"/>
+                              <a:pt x="318488" y="0"/>
+                            </a:cubicBezTo>
+                            <a:cubicBezTo>
+                              <a:pt x="536421" y="8850"/>
+                              <a:pt x="599021" y="143799"/>
+                              <a:pt x="636976" y="318488"/>
+                            </a:cubicBezTo>
+                            <a:cubicBezTo>
+                              <a:pt x="607394" y="523273"/>
+                              <a:pt x="487332" y="675955"/>
+                              <a:pt x="318488" y="636976"/>
+                            </a:cubicBezTo>
+                            <a:cubicBezTo>
+                              <a:pt x="125128" y="627421"/>
+                              <a:pt x="15360" y="501723"/>
+                              <a:pt x="0" y="318488"/>
+                            </a:cubicBezTo>
+                            <a:close/>
+                          </a:path>
+                        </a:pathLst>
+                      </a:custGeom>
+                      <ask:type>
+                        <ask:lineSketchNone/>
+                      </ask:type>
+                    </ask:lineSketchStyleProps>
+                  </a:ext>
+                </a:extLst>
               </a:ln>
             </p:spPr>
             <p:style>
@@ -34791,335 +34747,6 @@
         </p:grpSp>
         <p:grpSp>
           <p:nvGrpSpPr>
-            <p:cNvPr id="9" name="Group 8">
-              <a:extLst>
-                <a:ext uri="{FF2B5EF4-FFF2-40B4-BE49-F238E27FC236}">
-                  <a16:creationId xmlns:a16="http://schemas.microsoft.com/office/drawing/2014/main" id="{105322B4-670C-054E-98CF-5B7BFCE784C7}"/>
-                </a:ext>
-              </a:extLst>
-            </p:cNvPr>
-            <p:cNvGrpSpPr/>
-            <p:nvPr/>
-          </p:nvGrpSpPr>
-          <p:grpSpPr>
-            <a:xfrm>
-              <a:off x="8058043" y="11224923"/>
-              <a:ext cx="2392782" cy="538627"/>
-              <a:chOff x="8058043" y="11227737"/>
-              <a:chExt cx="2392782" cy="538627"/>
-            </a:xfrm>
-          </p:grpSpPr>
-          <p:sp>
-            <p:nvSpPr>
-              <p:cNvPr id="91" name="TextBox 90">
-                <a:extLst>
-                  <a:ext uri="{FF2B5EF4-FFF2-40B4-BE49-F238E27FC236}">
-                    <a16:creationId xmlns:a16="http://schemas.microsoft.com/office/drawing/2014/main" id="{AB720DAB-BBBA-1145-8AB7-FB67B76CAF88}"/>
-                  </a:ext>
-                </a:extLst>
-              </p:cNvPr>
-              <p:cNvSpPr txBox="1">
-                <a:spLocks noChangeAspect="1"/>
-              </p:cNvSpPr>
-              <p:nvPr/>
-            </p:nvSpPr>
-            <p:spPr>
-              <a:xfrm>
-                <a:off x="8637634" y="11281607"/>
-                <a:ext cx="1813191" cy="430887"/>
-              </a:xfrm>
-              <a:prstGeom prst="rect">
-                <a:avLst/>
-              </a:prstGeom>
-              <a:noFill/>
-            </p:spPr>
-            <p:txBody>
-              <a:bodyPr wrap="square" rtlCol="0">
-                <a:spAutoFit/>
-              </a:bodyPr>
-              <a:lstStyle/>
-              <a:p>
-                <a:r>
-                  <a:rPr lang="en-US" sz="2200" dirty="0"/>
-                  <a:t>Deterministic</a:t>
-                </a:r>
-              </a:p>
-            </p:txBody>
-          </p:sp>
-          <p:grpSp>
-            <p:nvGrpSpPr>
-              <p:cNvPr id="4" name="Group 3">
-                <a:extLst>
-                  <a:ext uri="{FF2B5EF4-FFF2-40B4-BE49-F238E27FC236}">
-                    <a16:creationId xmlns:a16="http://schemas.microsoft.com/office/drawing/2014/main" id="{4DB5AF68-2832-CE4D-95B1-2D6E9181D727}"/>
-                  </a:ext>
-                </a:extLst>
-              </p:cNvPr>
-              <p:cNvGrpSpPr/>
-              <p:nvPr/>
-            </p:nvGrpSpPr>
-            <p:grpSpPr>
-              <a:xfrm>
-                <a:off x="8058043" y="11227737"/>
-                <a:ext cx="538627" cy="538627"/>
-                <a:chOff x="8058043" y="11227737"/>
-                <a:chExt cx="538627" cy="538627"/>
-              </a:xfrm>
-            </p:grpSpPr>
-            <p:sp>
-              <p:nvSpPr>
-                <p:cNvPr id="155" name="Oval 154">
-                  <a:extLst>
-                    <a:ext uri="{FF2B5EF4-FFF2-40B4-BE49-F238E27FC236}">
-                      <a16:creationId xmlns:a16="http://schemas.microsoft.com/office/drawing/2014/main" id="{9BF83545-0987-DA4D-B079-17A8F9678B3A}"/>
-                    </a:ext>
-                  </a:extLst>
-                </p:cNvPr>
-                <p:cNvSpPr>
-                  <a:spLocks noChangeAspect="1"/>
-                </p:cNvSpPr>
-                <p:nvPr/>
-              </p:nvSpPr>
-              <p:spPr>
-                <a:xfrm>
-                  <a:off x="8058043" y="11227737"/>
-                  <a:ext cx="538627" cy="538627"/>
-                </a:xfrm>
-                <a:prstGeom prst="ellipse">
-                  <a:avLst/>
-                </a:prstGeom>
-                <a:noFill/>
-                <a:ln w="12700">
-                  <a:solidFill>
-                    <a:schemeClr val="tx1"/>
-                  </a:solidFill>
-                  <a:extLst>
-                    <a:ext uri="{C807C97D-BFC1-408E-A445-0C87EB9F89A2}">
-                      <ask:lineSketchStyleProps xmlns="" xmlns:ask="http://schemas.microsoft.com/office/drawing/2018/sketchyshapes" sd="1219033472">
-                        <a:custGeom>
-                          <a:avLst/>
-                          <a:gdLst>
-                            <a:gd name="connsiteX0" fmla="*/ 0 w 636975"/>
-                            <a:gd name="connsiteY0" fmla="*/ 318488 h 636975"/>
-                            <a:gd name="connsiteX1" fmla="*/ 318488 w 636975"/>
-                            <a:gd name="connsiteY1" fmla="*/ 0 h 636975"/>
-                            <a:gd name="connsiteX2" fmla="*/ 636976 w 636975"/>
-                            <a:gd name="connsiteY2" fmla="*/ 318488 h 636975"/>
-                            <a:gd name="connsiteX3" fmla="*/ 318488 w 636975"/>
-                            <a:gd name="connsiteY3" fmla="*/ 636976 h 636975"/>
-                            <a:gd name="connsiteX4" fmla="*/ 0 w 636975"/>
-                            <a:gd name="connsiteY4" fmla="*/ 318488 h 636975"/>
-                          </a:gdLst>
-                          <a:ahLst/>
-                          <a:cxnLst>
-                            <a:cxn ang="0">
-                              <a:pos x="connsiteX0" y="connsiteY0"/>
-                            </a:cxn>
-                            <a:cxn ang="0">
-                              <a:pos x="connsiteX1" y="connsiteY1"/>
-                            </a:cxn>
-                            <a:cxn ang="0">
-                              <a:pos x="connsiteX2" y="connsiteY2"/>
-                            </a:cxn>
-                            <a:cxn ang="0">
-                              <a:pos x="connsiteX3" y="connsiteY3"/>
-                            </a:cxn>
-                            <a:cxn ang="0">
-                              <a:pos x="connsiteX4" y="connsiteY4"/>
-                            </a:cxn>
-                          </a:cxnLst>
-                          <a:rect l="l" t="t" r="r" b="b"/>
-                          <a:pathLst>
-                            <a:path w="636975" h="636975" extrusionOk="0">
-                              <a:moveTo>
-                                <a:pt x="0" y="318488"/>
-                              </a:moveTo>
-                              <a:cubicBezTo>
-                                <a:pt x="-44217" y="115318"/>
-                                <a:pt x="124534" y="6778"/>
-                                <a:pt x="318488" y="0"/>
-                              </a:cubicBezTo>
-                              <a:cubicBezTo>
-                                <a:pt x="536421" y="8850"/>
-                                <a:pt x="599021" y="143799"/>
-                                <a:pt x="636976" y="318488"/>
-                              </a:cubicBezTo>
-                              <a:cubicBezTo>
-                                <a:pt x="607394" y="523273"/>
-                                <a:pt x="487332" y="675955"/>
-                                <a:pt x="318488" y="636976"/>
-                              </a:cubicBezTo>
-                              <a:cubicBezTo>
-                                <a:pt x="125128" y="627421"/>
-                                <a:pt x="15360" y="501723"/>
-                                <a:pt x="0" y="318488"/>
-                              </a:cubicBezTo>
-                              <a:close/>
-                            </a:path>
-                          </a:pathLst>
-                        </a:custGeom>
-                        <ask:type>
-                          <ask:lineSketchNone/>
-                        </ask:type>
-                      </ask:lineSketchStyleProps>
-                    </a:ext>
-                  </a:extLst>
-                </a:ln>
-              </p:spPr>
-              <p:style>
-                <a:lnRef idx="2">
-                  <a:schemeClr val="accent1">
-                    <a:shade val="50000"/>
-                  </a:schemeClr>
-                </a:lnRef>
-                <a:fillRef idx="1">
-                  <a:schemeClr val="accent1"/>
-                </a:fillRef>
-                <a:effectRef idx="0">
-                  <a:schemeClr val="accent1"/>
-                </a:effectRef>
-                <a:fontRef idx="minor">
-                  <a:schemeClr val="lt1"/>
-                </a:fontRef>
-              </p:style>
-              <p:txBody>
-                <a:bodyPr rtlCol="0" anchor="ctr"/>
-                <a:lstStyle/>
-                <a:p>
-                  <a:pPr algn="ctr"/>
-                  <a:endParaRPr lang="en-US" sz="2200"/>
-                </a:p>
-              </p:txBody>
-            </p:sp>
-            <p:sp>
-              <p:nvSpPr>
-                <p:cNvPr id="157" name="Oval 156">
-                  <a:extLst>
-                    <a:ext uri="{FF2B5EF4-FFF2-40B4-BE49-F238E27FC236}">
-                      <a16:creationId xmlns:a16="http://schemas.microsoft.com/office/drawing/2014/main" id="{27B1E6F3-15EF-9243-8347-AB2BD195B203}"/>
-                    </a:ext>
-                  </a:extLst>
-                </p:cNvPr>
-                <p:cNvSpPr>
-                  <a:spLocks noChangeAspect="1"/>
-                </p:cNvSpPr>
-                <p:nvPr/>
-              </p:nvSpPr>
-              <p:spPr>
-                <a:xfrm>
-                  <a:off x="8097197" y="11266891"/>
-                  <a:ext cx="460319" cy="460319"/>
-                </a:xfrm>
-                <a:prstGeom prst="ellipse">
-                  <a:avLst/>
-                </a:prstGeom>
-                <a:noFill/>
-                <a:ln w="12700">
-                  <a:solidFill>
-                    <a:schemeClr val="tx1"/>
-                  </a:solidFill>
-                  <a:extLst>
-                    <a:ext uri="{C807C97D-BFC1-408E-A445-0C87EB9F89A2}">
-                      <ask:lineSketchStyleProps xmlns="" xmlns:ask="http://schemas.microsoft.com/office/drawing/2018/sketchyshapes" sd="1219033472">
-                        <a:custGeom>
-                          <a:avLst/>
-                          <a:gdLst>
-                            <a:gd name="connsiteX0" fmla="*/ 0 w 636975"/>
-                            <a:gd name="connsiteY0" fmla="*/ 318488 h 636975"/>
-                            <a:gd name="connsiteX1" fmla="*/ 318488 w 636975"/>
-                            <a:gd name="connsiteY1" fmla="*/ 0 h 636975"/>
-                            <a:gd name="connsiteX2" fmla="*/ 636976 w 636975"/>
-                            <a:gd name="connsiteY2" fmla="*/ 318488 h 636975"/>
-                            <a:gd name="connsiteX3" fmla="*/ 318488 w 636975"/>
-                            <a:gd name="connsiteY3" fmla="*/ 636976 h 636975"/>
-                            <a:gd name="connsiteX4" fmla="*/ 0 w 636975"/>
-                            <a:gd name="connsiteY4" fmla="*/ 318488 h 636975"/>
-                          </a:gdLst>
-                          <a:ahLst/>
-                          <a:cxnLst>
-                            <a:cxn ang="0">
-                              <a:pos x="connsiteX0" y="connsiteY0"/>
-                            </a:cxn>
-                            <a:cxn ang="0">
-                              <a:pos x="connsiteX1" y="connsiteY1"/>
-                            </a:cxn>
-                            <a:cxn ang="0">
-                              <a:pos x="connsiteX2" y="connsiteY2"/>
-                            </a:cxn>
-                            <a:cxn ang="0">
-                              <a:pos x="connsiteX3" y="connsiteY3"/>
-                            </a:cxn>
-                            <a:cxn ang="0">
-                              <a:pos x="connsiteX4" y="connsiteY4"/>
-                            </a:cxn>
-                          </a:cxnLst>
-                          <a:rect l="l" t="t" r="r" b="b"/>
-                          <a:pathLst>
-                            <a:path w="636975" h="636975" extrusionOk="0">
-                              <a:moveTo>
-                                <a:pt x="0" y="318488"/>
-                              </a:moveTo>
-                              <a:cubicBezTo>
-                                <a:pt x="-44217" y="115318"/>
-                                <a:pt x="124534" y="6778"/>
-                                <a:pt x="318488" y="0"/>
-                              </a:cubicBezTo>
-                              <a:cubicBezTo>
-                                <a:pt x="536421" y="8850"/>
-                                <a:pt x="599021" y="143799"/>
-                                <a:pt x="636976" y="318488"/>
-                              </a:cubicBezTo>
-                              <a:cubicBezTo>
-                                <a:pt x="607394" y="523273"/>
-                                <a:pt x="487332" y="675955"/>
-                                <a:pt x="318488" y="636976"/>
-                              </a:cubicBezTo>
-                              <a:cubicBezTo>
-                                <a:pt x="125128" y="627421"/>
-                                <a:pt x="15360" y="501723"/>
-                                <a:pt x="0" y="318488"/>
-                              </a:cubicBezTo>
-                              <a:close/>
-                            </a:path>
-                          </a:pathLst>
-                        </a:custGeom>
-                        <ask:type>
-                          <ask:lineSketchNone/>
-                        </ask:type>
-                      </ask:lineSketchStyleProps>
-                    </a:ext>
-                  </a:extLst>
-                </a:ln>
-              </p:spPr>
-              <p:style>
-                <a:lnRef idx="2">
-                  <a:schemeClr val="accent1">
-                    <a:shade val="50000"/>
-                  </a:schemeClr>
-                </a:lnRef>
-                <a:fillRef idx="1">
-                  <a:schemeClr val="accent1"/>
-                </a:fillRef>
-                <a:effectRef idx="0">
-                  <a:schemeClr val="accent1"/>
-                </a:effectRef>
-                <a:fontRef idx="minor">
-                  <a:schemeClr val="lt1"/>
-                </a:fontRef>
-              </p:style>
-              <p:txBody>
-                <a:bodyPr rtlCol="0" anchor="ctr"/>
-                <a:lstStyle/>
-                <a:p>
-                  <a:pPr algn="ctr"/>
-                  <a:endParaRPr lang="en-US" sz="2200"/>
-                </a:p>
-              </p:txBody>
-            </p:sp>
-          </p:grpSp>
-        </p:grpSp>
-        <p:grpSp>
-          <p:nvGrpSpPr>
             <p:cNvPr id="14" name="Group 13">
               <a:extLst>
                 <a:ext uri="{FF2B5EF4-FFF2-40B4-BE49-F238E27FC236}">
@@ -35133,13 +34760,13 @@
           <p:grpSpPr>
             <a:xfrm>
               <a:off x="12982304" y="11109516"/>
-              <a:ext cx="2752237" cy="769441"/>
+              <a:ext cx="3182891" cy="769441"/>
               <a:chOff x="12982304" y="11109516"/>
-              <a:chExt cx="2752237" cy="769441"/>
+              <a:chExt cx="3182891" cy="769441"/>
             </a:xfrm>
           </p:grpSpPr>
-          <mc:AlternateContent xmlns:mc="http://schemas.openxmlformats.org/markup-compatibility/2006" xmlns:a14="http://schemas.microsoft.com/office/drawing/2010/main">
-            <mc:Choice Requires="a14">
+          <mc:AlternateContent xmlns:mc="http://schemas.openxmlformats.org/markup-compatibility/2006">
+            <mc:Choice xmlns:a14="http://schemas.microsoft.com/office/drawing/2010/main" Requires="a14">
               <p:sp>
                 <p:nvSpPr>
                   <p:cNvPr id="290" name="TextBox 289">
@@ -35163,8 +34790,8 @@
                     <a:avLst/>
                   </a:prstGeom>
                   <a:solidFill>
-                    <a:schemeClr val="bg1">
-                      <a:lumMod val="75000"/>
+                    <a:schemeClr val="bg2">
+                      <a:lumMod val="10000"/>
                     </a:schemeClr>
                   </a:solidFill>
                 </p:spPr>
@@ -35183,6 +34810,9 @@
                         <m:oMath xmlns:m="http://schemas.openxmlformats.org/officeDocument/2006/math">
                           <m:r>
                             <a:rPr lang="en-US" sz="2200" b="0" i="1" smtClean="0">
+                              <a:solidFill>
+                                <a:schemeClr val="bg1"/>
+                              </a:solidFill>
                               <a:latin typeface="Cambria Math" panose="02040503050406030204" pitchFamily="18" charset="0"/>
                             </a:rPr>
                             <m:t>𝑁𝑎𝑚𝑒</m:t>
@@ -35190,12 +34820,16 @@
                         </m:oMath>
                       </m:oMathPara>
                     </a14:m>
-                    <a:endParaRPr lang="en-US" sz="2200" dirty="0"/>
+                    <a:endParaRPr lang="en-US" sz="2200" dirty="0">
+                      <a:solidFill>
+                        <a:schemeClr val="bg1"/>
+                      </a:solidFill>
+                    </a:endParaRPr>
                   </a:p>
                 </p:txBody>
               </p:sp>
             </mc:Choice>
-            <mc:Fallback xmlns="">
+            <mc:Fallback>
               <p:sp>
                 <p:nvSpPr>
                   <p:cNvPr id="290" name="TextBox 289">
@@ -35257,7 +34891,7 @@
             <p:spPr>
               <a:xfrm>
                 <a:off x="13921350" y="11109516"/>
-                <a:ext cx="1813191" cy="769441"/>
+                <a:ext cx="2243845" cy="769441"/>
               </a:xfrm>
               <a:prstGeom prst="rect">
                 <a:avLst/>
@@ -35272,7 +34906,7 @@
               <a:p>
                 <a:r>
                   <a:rPr lang="en-US" sz="2200" dirty="0"/>
-                  <a:t>User-provided parameter</a:t>
+                  <a:t>User-provided hyper-parameter</a:t>
                 </a:r>
               </a:p>
             </p:txBody>
@@ -35304,8 +34938,8 @@
                 <a:avLst/>
               </a:prstGeom>
               <a:solidFill>
-                <a:schemeClr val="bg1">
-                  <a:lumMod val="75000"/>
+                <a:schemeClr val="bg2">
+                  <a:lumMod val="10000"/>
                 </a:schemeClr>
               </a:solidFill>
             </p:spPr>
@@ -35327,7 +34961,7 @@
                           <m:ctrlPr>
                             <a:rPr lang="en-US" sz="1800" b="0" i="1" smtClean="0">
                               <a:solidFill>
-                                <a:prstClr val="black"/>
+                                <a:schemeClr val="bg1"/>
                               </a:solidFill>
                               <a:latin typeface="Cambria Math" panose="02040503050406030204" pitchFamily="18" charset="0"/>
                             </a:rPr>
@@ -35337,7 +34971,7 @@
                           <m:r>
                             <a:rPr lang="en-US" sz="1800" i="1">
                               <a:solidFill>
-                                <a:prstClr val="black"/>
+                                <a:schemeClr val="bg1"/>
                               </a:solidFill>
                               <a:latin typeface="Cambria Math" panose="02040503050406030204" pitchFamily="18" charset="0"/>
                             </a:rPr>
@@ -35348,7 +34982,7 @@
                           <m:r>
                             <a:rPr lang="en-US" sz="1800" b="0" i="1" smtClean="0">
                               <a:solidFill>
-                                <a:prstClr val="black"/>
+                                <a:schemeClr val="bg1"/>
                               </a:solidFill>
                               <a:latin typeface="Cambria Math" panose="02040503050406030204" pitchFamily="18" charset="0"/>
                             </a:rPr>
@@ -35359,7 +34993,7 @@
                       <m:r>
                         <a:rPr lang="en-US" sz="1800" b="0" i="1" smtClean="0">
                           <a:solidFill>
-                            <a:prstClr val="black"/>
+                            <a:schemeClr val="bg1"/>
                           </a:solidFill>
                           <a:latin typeface="Cambria Math" panose="02040503050406030204" pitchFamily="18" charset="0"/>
                         </a:rPr>
@@ -35370,7 +35004,7 @@
                           <m:ctrlPr>
                             <a:rPr lang="en-US" sz="1800" i="1">
                               <a:solidFill>
-                                <a:prstClr val="black"/>
+                                <a:schemeClr val="bg1"/>
                               </a:solidFill>
                               <a:latin typeface="Cambria Math" panose="02040503050406030204" pitchFamily="18" charset="0"/>
                             </a:rPr>
@@ -35380,7 +35014,7 @@
                           <m:r>
                             <a:rPr lang="en-US" sz="1800" i="1">
                               <a:solidFill>
-                                <a:prstClr val="black"/>
+                                <a:schemeClr val="bg1"/>
                               </a:solidFill>
                               <a:latin typeface="Cambria Math" panose="02040503050406030204" pitchFamily="18" charset="0"/>
                             </a:rPr>
@@ -35391,7 +35025,7 @@
                           <m:r>
                             <a:rPr lang="en-US" sz="1800" i="1">
                               <a:solidFill>
-                                <a:prstClr val="black"/>
+                                <a:schemeClr val="bg1"/>
                               </a:solidFill>
                               <a:latin typeface="Cambria Math" panose="02040503050406030204" pitchFamily="18" charset="0"/>
                             </a:rPr>
@@ -35402,7 +35036,11 @@
                     </m:oMath>
                   </m:oMathPara>
                 </a14:m>
-                <a:endParaRPr lang="en-US" sz="1800" dirty="0"/>
+                <a:endParaRPr lang="en-US" sz="1800" dirty="0">
+                  <a:solidFill>
+                    <a:schemeClr val="bg1"/>
+                  </a:solidFill>
+                </a:endParaRPr>
               </a:p>
             </p:txBody>
           </p:sp>
@@ -35760,8 +35398,8 @@
           </p:sp>
         </mc:Fallback>
       </mc:AlternateContent>
-      <mc:AlternateContent xmlns:mc="http://schemas.openxmlformats.org/markup-compatibility/2006" xmlns:a14="http://schemas.microsoft.com/office/drawing/2010/main">
-        <mc:Choice Requires="a14">
+      <mc:AlternateContent xmlns:mc="http://schemas.openxmlformats.org/markup-compatibility/2006">
+        <mc:Choice xmlns:a14="http://schemas.microsoft.com/office/drawing/2010/main" Requires="a14">
           <p:sp>
             <p:nvSpPr>
               <p:cNvPr id="118" name="TextBox 117">
@@ -35778,15 +35416,15 @@
             </p:nvSpPr>
             <p:spPr>
               <a:xfrm>
-                <a:off x="10941074" y="5498565"/>
-                <a:ext cx="335595" cy="284437"/>
+                <a:off x="10955517" y="5498565"/>
+                <a:ext cx="305631" cy="284437"/>
               </a:xfrm>
               <a:prstGeom prst="rect">
                 <a:avLst/>
               </a:prstGeom>
               <a:solidFill>
-                <a:schemeClr val="bg1">
-                  <a:lumMod val="75000"/>
+                <a:schemeClr val="bg2">
+                  <a:lumMod val="10000"/>
                 </a:schemeClr>
               </a:solidFill>
             </p:spPr>
@@ -35803,52 +35441,43 @@
                       <m:jc m:val="centerGroup"/>
                     </m:oMathParaPr>
                     <m:oMath xmlns:m="http://schemas.openxmlformats.org/officeDocument/2006/math">
-                      <m:sSub>
-                        <m:sSubPr>
+                      <m:acc>
+                        <m:accPr>
+                          <m:chr m:val="̂"/>
                           <m:ctrlPr>
                             <a:rPr lang="en-US" sz="1800" i="1" smtClean="0">
+                              <a:solidFill>
+                                <a:schemeClr val="bg1"/>
+                              </a:solidFill>
                               <a:latin typeface="Cambria Math" panose="02040503050406030204" pitchFamily="18" charset="0"/>
                             </a:rPr>
                           </m:ctrlPr>
-                        </m:sSubPr>
+                        </m:accPr>
                         <m:e>
-                          <m:acc>
-                            <m:accPr>
-                              <m:chr m:val="̂"/>
-                              <m:ctrlPr>
-                                <a:rPr lang="en-US" sz="1800" i="1" smtClean="0">
-                                  <a:latin typeface="Cambria Math" panose="02040503050406030204" pitchFamily="18" charset="0"/>
-                                </a:rPr>
-                              </m:ctrlPr>
-                            </m:accPr>
-                            <m:e>
-                              <m:r>
-                                <a:rPr lang="en-US" sz="1800" b="0" i="1" smtClean="0">
-                                  <a:latin typeface="Cambria Math" panose="02040503050406030204" pitchFamily="18" charset="0"/>
-                                </a:rPr>
-                                <m:t>𝑁</m:t>
-                              </m:r>
-                            </m:e>
-                          </m:acc>
-                        </m:e>
-                        <m:sub>
                           <m:r>
-                            <a:rPr lang="en-US" sz="1800" b="0" i="1" smtClean="0">
+                            <a:rPr lang="en-US" sz="1800" i="1">
+                              <a:solidFill>
+                                <a:schemeClr val="bg1"/>
+                              </a:solidFill>
                               <a:latin typeface="Cambria Math" panose="02040503050406030204" pitchFamily="18" charset="0"/>
                             </a:rPr>
-                            <m:t>𝑠</m:t>
+                            <m:t>𝑁</m:t>
                           </m:r>
-                        </m:sub>
-                      </m:sSub>
+                        </m:e>
+                      </m:acc>
                     </m:oMath>
                   </m:oMathPara>
                 </a14:m>
-                <a:endParaRPr lang="en-US" sz="1800" dirty="0"/>
+                <a:endParaRPr lang="en-US" sz="1800" dirty="0">
+                  <a:solidFill>
+                    <a:schemeClr val="bg1"/>
+                  </a:solidFill>
+                </a:endParaRPr>
               </a:p>
             </p:txBody>
           </p:sp>
         </mc:Choice>
-        <mc:Fallback xmlns="">
+        <mc:Fallback>
           <p:sp>
             <p:nvSpPr>
               <p:cNvPr id="118" name="TextBox 117">
@@ -35865,8 +35494,8 @@
             </p:nvSpPr>
             <p:spPr>
               <a:xfrm>
-                <a:off x="10941074" y="5498565"/>
-                <a:ext cx="335595" cy="284437"/>
+                <a:off x="10955517" y="5498565"/>
+                <a:ext cx="305631" cy="284437"/>
               </a:xfrm>
               <a:prstGeom prst="rect">
                 <a:avLst/>
@@ -35874,7 +35503,7 @@
               <a:blipFill>
                 <a:blip r:embed="rId34"/>
                 <a:stretch>
-                  <a:fillRect l="-11111" t="-17391" b="-8696"/>
+                  <a:fillRect l="-4000" t="-17391" b="-4348"/>
                 </a:stretch>
               </a:blipFill>
             </p:spPr>
@@ -35893,8 +35522,8 @@
           </p:sp>
         </mc:Fallback>
       </mc:AlternateContent>
-      <mc:AlternateContent xmlns:mc="http://schemas.openxmlformats.org/markup-compatibility/2006" xmlns:a14="http://schemas.microsoft.com/office/drawing/2010/main">
-        <mc:Choice Requires="a14">
+      <mc:AlternateContent xmlns:mc="http://schemas.openxmlformats.org/markup-compatibility/2006">
+        <mc:Choice xmlns:a14="http://schemas.microsoft.com/office/drawing/2010/main" Requires="a14">
           <p:sp>
             <p:nvSpPr>
               <p:cNvPr id="126" name="TextBox 125">
@@ -35918,8 +35547,8 @@
                 <a:avLst/>
               </a:prstGeom>
               <a:solidFill>
-                <a:schemeClr val="bg1">
-                  <a:lumMod val="75000"/>
+                <a:schemeClr val="bg2">
+                  <a:lumMod val="10000"/>
                 </a:schemeClr>
               </a:solidFill>
             </p:spPr>
@@ -35941,6 +35570,9 @@
                           <m:chr m:val="̂"/>
                           <m:ctrlPr>
                             <a:rPr lang="en-US" sz="1800" b="0" i="1" smtClean="0">
+                              <a:solidFill>
+                                <a:schemeClr val="bg1"/>
+                              </a:solidFill>
                               <a:latin typeface="Cambria Math" panose="02040503050406030204" pitchFamily="18" charset="0"/>
                             </a:rPr>
                           </m:ctrlPr>
@@ -35948,6 +35580,9 @@
                         <m:e>
                           <m:r>
                             <a:rPr lang="en-US" sz="1800" b="0" i="1" smtClean="0">
+                              <a:solidFill>
+                                <a:schemeClr val="bg1"/>
+                              </a:solidFill>
                               <a:latin typeface="Cambria Math" panose="02040503050406030204" pitchFamily="18" charset="0"/>
                             </a:rPr>
                             <m:t>𝐴</m:t>
@@ -35956,6 +35591,9 @@
                       </m:acc>
                       <m:r>
                         <a:rPr lang="en-US" sz="1800" b="0" i="1" smtClean="0">
+                          <a:solidFill>
+                            <a:schemeClr val="bg1"/>
+                          </a:solidFill>
                           <a:latin typeface="Cambria Math" panose="02040503050406030204" pitchFamily="18" charset="0"/>
                         </a:rPr>
                         <m:t>/</m:t>
@@ -35965,6 +35603,9 @@
                           <m:chr m:val="̂"/>
                           <m:ctrlPr>
                             <a:rPr lang="en-US" sz="1800" i="1" smtClean="0">
+                              <a:solidFill>
+                                <a:schemeClr val="bg1"/>
+                              </a:solidFill>
                               <a:latin typeface="Cambria Math" panose="02040503050406030204" pitchFamily="18" charset="0"/>
                             </a:rPr>
                           </m:ctrlPr>
@@ -35972,6 +35613,9 @@
                         <m:e>
                           <m:r>
                             <a:rPr lang="en-US" sz="1800" b="0" i="1" smtClean="0">
+                              <a:solidFill>
+                                <a:schemeClr val="bg1"/>
+                              </a:solidFill>
                               <a:latin typeface="Cambria Math" panose="02040503050406030204" pitchFamily="18" charset="0"/>
                             </a:rPr>
                             <m:t>𝑌</m:t>
@@ -35981,12 +35625,16 @@
                     </m:oMath>
                   </m:oMathPara>
                 </a14:m>
-                <a:endParaRPr lang="en-US" sz="1800" i="1" dirty="0"/>
+                <a:endParaRPr lang="en-US" sz="1800" i="1" dirty="0">
+                  <a:solidFill>
+                    <a:schemeClr val="bg1"/>
+                  </a:solidFill>
+                </a:endParaRPr>
               </a:p>
             </p:txBody>
           </p:sp>
         </mc:Choice>
-        <mc:Fallback xmlns="">
+        <mc:Fallback>
           <p:sp>
             <p:nvSpPr>
               <p:cNvPr id="126" name="TextBox 125">
@@ -36148,6 +35796,166 @@
           </p:sp>
         </mc:Fallback>
       </mc:AlternateContent>
+      <p:grpSp>
+        <p:nvGrpSpPr>
+          <p:cNvPr id="31" name="Group 30">
+            <a:extLst>
+              <a:ext uri="{FF2B5EF4-FFF2-40B4-BE49-F238E27FC236}">
+                <a16:creationId xmlns:a16="http://schemas.microsoft.com/office/drawing/2014/main" id="{7D3A93A9-1166-824E-ACC3-67F183EFF99A}"/>
+              </a:ext>
+            </a:extLst>
+          </p:cNvPr>
+          <p:cNvGrpSpPr/>
+          <p:nvPr/>
+        </p:nvGrpSpPr>
+        <p:grpSpPr>
+          <a:xfrm>
+            <a:off x="8314531" y="11154324"/>
+            <a:ext cx="2752237" cy="769441"/>
+            <a:chOff x="8611538" y="11179234"/>
+            <a:chExt cx="2752237" cy="769441"/>
+          </a:xfrm>
+        </p:grpSpPr>
+        <mc:AlternateContent xmlns:mc="http://schemas.openxmlformats.org/markup-compatibility/2006">
+          <mc:Choice xmlns:a14="http://schemas.microsoft.com/office/drawing/2010/main" Requires="a14">
+            <p:sp>
+              <p:nvSpPr>
+                <p:cNvPr id="125" name="TextBox 124">
+                  <a:extLst>
+                    <a:ext uri="{FF2B5EF4-FFF2-40B4-BE49-F238E27FC236}">
+                      <a16:creationId xmlns:a16="http://schemas.microsoft.com/office/drawing/2014/main" id="{19299760-10A5-7C42-82CA-854D0BBF1587}"/>
+                    </a:ext>
+                  </a:extLst>
+                </p:cNvPr>
+                <p:cNvSpPr txBox="1">
+                  <a:spLocks noChangeAspect="1"/>
+                </p:cNvSpPr>
+                <p:nvPr/>
+              </p:nvSpPr>
+              <p:spPr>
+                <a:xfrm>
+                  <a:off x="8611538" y="11391631"/>
+                  <a:ext cx="899892" cy="344646"/>
+                </a:xfrm>
+                <a:prstGeom prst="rect">
+                  <a:avLst/>
+                </a:prstGeom>
+                <a:solidFill>
+                  <a:schemeClr val="bg1">
+                    <a:lumMod val="75000"/>
+                  </a:schemeClr>
+                </a:solidFill>
+              </p:spPr>
+              <p:txBody>
+                <a:bodyPr wrap="square" lIns="0" tIns="0" rIns="0" bIns="0" rtlCol="0">
+                  <a:spAutoFit/>
+                </a:bodyPr>
+                <a:lstStyle/>
+                <a:p>
+                  <a:pPr/>
+                  <a14:m>
+                    <m:oMathPara xmlns:m="http://schemas.openxmlformats.org/officeDocument/2006/math">
+                      <m:oMathParaPr>
+                        <m:jc m:val="centerGroup"/>
+                      </m:oMathParaPr>
+                      <m:oMath xmlns:m="http://schemas.openxmlformats.org/officeDocument/2006/math">
+                        <m:r>
+                          <a:rPr lang="en-US" sz="2200" b="0" i="1" smtClean="0">
+                            <a:latin typeface="Cambria Math" panose="02040503050406030204" pitchFamily="18" charset="0"/>
+                          </a:rPr>
+                          <m:t>𝑁𝑎𝑚𝑒</m:t>
+                        </m:r>
+                      </m:oMath>
+                    </m:oMathPara>
+                  </a14:m>
+                  <a:endParaRPr lang="en-US" sz="2200" dirty="0"/>
+                </a:p>
+              </p:txBody>
+            </p:sp>
+          </mc:Choice>
+          <mc:Fallback>
+            <p:sp>
+              <p:nvSpPr>
+                <p:cNvPr id="125" name="TextBox 124">
+                  <a:extLst>
+                    <a:ext uri="{FF2B5EF4-FFF2-40B4-BE49-F238E27FC236}">
+                      <a16:creationId xmlns:a16="http://schemas.microsoft.com/office/drawing/2014/main" id="{19299760-10A5-7C42-82CA-854D0BBF1587}"/>
+                    </a:ext>
+                  </a:extLst>
+                </p:cNvPr>
+                <p:cNvSpPr txBox="1">
+                  <a:spLocks noRot="1" noChangeAspect="1" noMove="1" noResize="1" noEditPoints="1" noAdjustHandles="1" noChangeArrowheads="1" noChangeShapeType="1" noTextEdit="1"/>
+                </p:cNvSpPr>
+                <p:nvPr/>
+              </p:nvSpPr>
+              <p:spPr>
+                <a:xfrm>
+                  <a:off x="8611538" y="11391631"/>
+                  <a:ext cx="899892" cy="344646"/>
+                </a:xfrm>
+                <a:prstGeom prst="rect">
+                  <a:avLst/>
+                </a:prstGeom>
+                <a:blipFill>
+                  <a:blip r:embed="rId37"/>
+                  <a:stretch>
+                    <a:fillRect l="-1389" b="-3571"/>
+                  </a:stretch>
+                </a:blipFill>
+              </p:spPr>
+              <p:txBody>
+                <a:bodyPr/>
+                <a:lstStyle/>
+                <a:p>
+                  <a:r>
+                    <a:rPr lang="en-US">
+                      <a:noFill/>
+                    </a:rPr>
+                    <a:t> </a:t>
+                  </a:r>
+                </a:p>
+              </p:txBody>
+            </p:sp>
+          </mc:Fallback>
+        </mc:AlternateContent>
+        <p:sp>
+          <p:nvSpPr>
+            <p:cNvPr id="127" name="TextBox 126">
+              <a:extLst>
+                <a:ext uri="{FF2B5EF4-FFF2-40B4-BE49-F238E27FC236}">
+                  <a16:creationId xmlns:a16="http://schemas.microsoft.com/office/drawing/2014/main" id="{7796C60E-109E-C24C-862C-67349EB5FF4A}"/>
+                </a:ext>
+              </a:extLst>
+            </p:cNvPr>
+            <p:cNvSpPr txBox="1">
+              <a:spLocks noChangeAspect="1"/>
+            </p:cNvSpPr>
+            <p:nvPr/>
+          </p:nvSpPr>
+          <p:spPr>
+            <a:xfrm>
+              <a:off x="9550584" y="11179234"/>
+              <a:ext cx="1813191" cy="769441"/>
+            </a:xfrm>
+            <a:prstGeom prst="rect">
+              <a:avLst/>
+            </a:prstGeom>
+            <a:noFill/>
+          </p:spPr>
+          <p:txBody>
+            <a:bodyPr wrap="square" rtlCol="0">
+              <a:spAutoFit/>
+            </a:bodyPr>
+            <a:lstStyle/>
+            <a:p>
+              <a:r>
+                <a:rPr lang="en-US" sz="2200" dirty="0"/>
+                <a:t>Default hyper-parameter</a:t>
+              </a:r>
+            </a:p>
+          </p:txBody>
+        </p:sp>
+      </p:grpSp>
     </p:spTree>
     <p:extLst>
       <p:ext uri="{BB962C8B-B14F-4D97-AF65-F5344CB8AC3E}">

</xml_diff>

<commit_message>
final version of the suppl methods
</commit_message>
<xml_diff>
--- a/images/LocationModelLinearDependentW.pptx
+++ b/images/LocationModelLinearDependentW.pptx
@@ -31043,8 +31043,8 @@
           </a:p>
         </p:txBody>
       </p:sp>
-      <mc:AlternateContent xmlns:mc="http://schemas.openxmlformats.org/markup-compatibility/2006" xmlns:a14="http://schemas.microsoft.com/office/drawing/2010/main">
-        <mc:Choice Requires="a14">
+      <mc:AlternateContent xmlns:mc="http://schemas.openxmlformats.org/markup-compatibility/2006">
+        <mc:Choice xmlns:a14="http://schemas.microsoft.com/office/drawing/2010/main" Requires="a14">
           <p:sp>
             <p:nvSpPr>
               <p:cNvPr id="80" name="TextBox 79">
@@ -31061,7 +31061,7 @@
             </p:nvSpPr>
             <p:spPr>
               <a:xfrm>
-                <a:off x="6974367" y="5406576"/>
+                <a:off x="6944640" y="5444576"/>
                 <a:ext cx="309738" cy="299569"/>
               </a:xfrm>
               <a:prstGeom prst="rect">
@@ -31095,7 +31095,7 @@
                             <a:rPr lang="en-US" sz="1800" i="1">
                               <a:latin typeface="Cambria Math" panose="02040503050406030204" pitchFamily="18" charset="0"/>
                             </a:rPr>
-                            <m:t>𝑜</m:t>
+                            <m:t>⍺</m:t>
                           </m:r>
                         </m:e>
                         <m:sub>
@@ -31115,7 +31115,7 @@
             </p:txBody>
           </p:sp>
         </mc:Choice>
-        <mc:Fallback xmlns="">
+        <mc:Fallback>
           <p:sp>
             <p:nvSpPr>
               <p:cNvPr id="80" name="TextBox 79">
@@ -31132,7 +31132,7 @@
             </p:nvSpPr>
             <p:spPr>
               <a:xfrm>
-                <a:off x="6974367" y="5406576"/>
+                <a:off x="6944640" y="5444576"/>
                 <a:ext cx="309738" cy="299569"/>
               </a:xfrm>
               <a:prstGeom prst="rect">
@@ -31141,7 +31141,7 @@
               <a:blipFill>
                 <a:blip r:embed="rId17"/>
                 <a:stretch>
-                  <a:fillRect l="-3846" b="-20833"/>
+                  <a:fillRect l="-8000" r="-4000" b="-16667"/>
                 </a:stretch>
               </a:blipFill>
             </p:spPr>
@@ -32301,8 +32301,8 @@
           </a:fontRef>
         </p:style>
       </p:cxnSp>
-      <mc:AlternateContent xmlns:mc="http://schemas.openxmlformats.org/markup-compatibility/2006" xmlns:a14="http://schemas.microsoft.com/office/drawing/2010/main">
-        <mc:Choice Requires="a14">
+      <mc:AlternateContent xmlns:mc="http://schemas.openxmlformats.org/markup-compatibility/2006">
+        <mc:Choice xmlns:a14="http://schemas.microsoft.com/office/drawing/2010/main" Requires="a14">
           <p:sp>
             <p:nvSpPr>
               <p:cNvPr id="159" name="TextBox 158">
@@ -32319,7 +32319,7 @@
             </p:nvSpPr>
             <p:spPr>
               <a:xfrm>
-                <a:off x="10997135" y="4870729"/>
+                <a:off x="11025581" y="4882182"/>
                 <a:ext cx="275668" cy="281937"/>
               </a:xfrm>
               <a:prstGeom prst="rect">
@@ -32373,7 +32373,7 @@
             </p:txBody>
           </p:sp>
         </mc:Choice>
-        <mc:Fallback xmlns="">
+        <mc:Fallback>
           <p:sp>
             <p:nvSpPr>
               <p:cNvPr id="159" name="TextBox 158">
@@ -32390,7 +32390,7 @@
             </p:nvSpPr>
             <p:spPr>
               <a:xfrm>
-                <a:off x="10997135" y="4870729"/>
+                <a:off x="11025581" y="4882182"/>
                 <a:ext cx="275668" cy="281937"/>
               </a:xfrm>
               <a:prstGeom prst="rect">
@@ -32399,7 +32399,7 @@
               <a:blipFill>
                 <a:blip r:embed="rId21"/>
                 <a:stretch>
-                  <a:fillRect l="-4348" t="-4545"/>
+                  <a:fillRect l="-8696"/>
                 </a:stretch>
               </a:blipFill>
             </p:spPr>

</xml_diff>